<commit_message>
Fixup a docstring Remove master from tutorial figure ppts  refs #23234
</commit_message>
<xml_diff>
--- a/tutorials/tutorial02_multiapps/doc/content/getting_started/examples_and_tutorials/tutorial02_multiapps/images/coupling.pptx
+++ b/tutorials/tutorial02_multiapps/doc/content/getting_started/examples_and_tutorials/tutorial02_multiapps/images/coupling.pptx
@@ -105,6 +105,11 @@
       </a:defRPr>
     </a:lvl9pPr>
   </p:defaultTextStyle>
+  <p:extLst>
+    <p:ext uri="{EFAFB233-063F-42B5-8137-9DF3F51BA10A}">
+      <p15:sldGuideLst xmlns:p15="http://schemas.microsoft.com/office/powerpoint/2012/main"/>
+    </p:ext>
+  </p:extLst>
 </p:presentation>
 </file>
 
@@ -255,7 +260,7 @@
           <a:p>
             <a:fld id="{C9D24EB7-9BCA-FE44-A711-C52D20478F78}" type="datetimeFigureOut">
               <a:rPr lang="en-US" smtClean="0"/>
-              <a:t>1/13/21</a:t>
+              <a:t>9/10/23</a:t>
             </a:fld>
             <a:endParaRPr lang="en-US"/>
           </a:p>
@@ -453,7 +458,7 @@
           <a:p>
             <a:fld id="{C9D24EB7-9BCA-FE44-A711-C52D20478F78}" type="datetimeFigureOut">
               <a:rPr lang="en-US" smtClean="0"/>
-              <a:t>1/13/21</a:t>
+              <a:t>9/10/23</a:t>
             </a:fld>
             <a:endParaRPr lang="en-US"/>
           </a:p>
@@ -661,7 +666,7 @@
           <a:p>
             <a:fld id="{C9D24EB7-9BCA-FE44-A711-C52D20478F78}" type="datetimeFigureOut">
               <a:rPr lang="en-US" smtClean="0"/>
-              <a:t>1/13/21</a:t>
+              <a:t>9/10/23</a:t>
             </a:fld>
             <a:endParaRPr lang="en-US"/>
           </a:p>
@@ -859,7 +864,7 @@
           <a:p>
             <a:fld id="{C9D24EB7-9BCA-FE44-A711-C52D20478F78}" type="datetimeFigureOut">
               <a:rPr lang="en-US" smtClean="0"/>
-              <a:t>1/13/21</a:t>
+              <a:t>9/10/23</a:t>
             </a:fld>
             <a:endParaRPr lang="en-US"/>
           </a:p>
@@ -1134,7 +1139,7 @@
           <a:p>
             <a:fld id="{C9D24EB7-9BCA-FE44-A711-C52D20478F78}" type="datetimeFigureOut">
               <a:rPr lang="en-US" smtClean="0"/>
-              <a:t>1/13/21</a:t>
+              <a:t>9/10/23</a:t>
             </a:fld>
             <a:endParaRPr lang="en-US"/>
           </a:p>
@@ -1399,7 +1404,7 @@
           <a:p>
             <a:fld id="{C9D24EB7-9BCA-FE44-A711-C52D20478F78}" type="datetimeFigureOut">
               <a:rPr lang="en-US" smtClean="0"/>
-              <a:t>1/13/21</a:t>
+              <a:t>9/10/23</a:t>
             </a:fld>
             <a:endParaRPr lang="en-US"/>
           </a:p>
@@ -1811,7 +1816,7 @@
           <a:p>
             <a:fld id="{C9D24EB7-9BCA-FE44-A711-C52D20478F78}" type="datetimeFigureOut">
               <a:rPr lang="en-US" smtClean="0"/>
-              <a:t>1/13/21</a:t>
+              <a:t>9/10/23</a:t>
             </a:fld>
             <a:endParaRPr lang="en-US"/>
           </a:p>
@@ -1952,7 +1957,7 @@
           <a:p>
             <a:fld id="{C9D24EB7-9BCA-FE44-A711-C52D20478F78}" type="datetimeFigureOut">
               <a:rPr lang="en-US" smtClean="0"/>
-              <a:t>1/13/21</a:t>
+              <a:t>9/10/23</a:t>
             </a:fld>
             <a:endParaRPr lang="en-US"/>
           </a:p>
@@ -2065,7 +2070,7 @@
           <a:p>
             <a:fld id="{C9D24EB7-9BCA-FE44-A711-C52D20478F78}" type="datetimeFigureOut">
               <a:rPr lang="en-US" smtClean="0"/>
-              <a:t>1/13/21</a:t>
+              <a:t>9/10/23</a:t>
             </a:fld>
             <a:endParaRPr lang="en-US"/>
           </a:p>
@@ -2376,7 +2381,7 @@
           <a:p>
             <a:fld id="{C9D24EB7-9BCA-FE44-A711-C52D20478F78}" type="datetimeFigureOut">
               <a:rPr lang="en-US" smtClean="0"/>
-              <a:t>1/13/21</a:t>
+              <a:t>9/10/23</a:t>
             </a:fld>
             <a:endParaRPr lang="en-US"/>
           </a:p>
@@ -2664,7 +2669,7 @@
           <a:p>
             <a:fld id="{C9D24EB7-9BCA-FE44-A711-C52D20478F78}" type="datetimeFigureOut">
               <a:rPr lang="en-US" smtClean="0"/>
-              <a:t>1/13/21</a:t>
+              <a:t>9/10/23</a:t>
             </a:fld>
             <a:endParaRPr lang="en-US"/>
           </a:p>
@@ -2905,7 +2910,7 @@
           <a:p>
             <a:fld id="{C9D24EB7-9BCA-FE44-A711-C52D20478F78}" type="datetimeFigureOut">
               <a:rPr lang="en-US" smtClean="0"/>
-              <a:t>1/13/21</a:t>
+              <a:t>9/10/23</a:t>
             </a:fld>
             <a:endParaRPr lang="en-US"/>
           </a:p>
@@ -3366,7 +3371,7 @@
             <a:pPr algn="ctr"/>
             <a:r>
               <a:rPr lang="en-US" dirty="0"/>
-              <a:t>Master</a:t>
+              <a:t>Parent</a:t>
             </a:r>
           </a:p>
         </p:txBody>
@@ -3813,7 +3818,7 @@
             <a:pPr algn="ctr"/>
             <a:r>
               <a:rPr lang="en-US" dirty="0"/>
-              <a:t>Sub-App</a:t>
+              <a:t>Child-App</a:t>
             </a:r>
           </a:p>
         </p:txBody>
@@ -4140,7 +4145,7 @@
             <a:pPr algn="ctr"/>
             <a:r>
               <a:rPr lang="en-US" dirty="0"/>
-              <a:t>Master</a:t>
+              <a:t>Parent</a:t>
             </a:r>
           </a:p>
         </p:txBody>
@@ -4358,7 +4363,7 @@
             <a:pPr algn="ctr"/>
             <a:r>
               <a:rPr lang="en-US" dirty="0"/>
-              <a:t>Sub-App</a:t>
+              <a:t>Child-App</a:t>
             </a:r>
           </a:p>
         </p:txBody>
@@ -4901,7 +4906,7 @@
             <a:pPr algn="ctr"/>
             <a:r>
               <a:rPr lang="en-US" dirty="0"/>
-              <a:t>Master</a:t>
+              <a:t>Parent</a:t>
             </a:r>
           </a:p>
         </p:txBody>
@@ -5348,7 +5353,7 @@
             <a:pPr algn="ctr"/>
             <a:r>
               <a:rPr lang="en-US" dirty="0"/>
-              <a:t>Sub-App</a:t>
+              <a:t>Child-App</a:t>
             </a:r>
           </a:p>
         </p:txBody>
@@ -6000,7 +6005,7 @@
             <a:pPr algn="ctr"/>
             <a:r>
               <a:rPr lang="en-US" dirty="0"/>
-              <a:t>Master</a:t>
+              <a:t>Parent</a:t>
             </a:r>
           </a:p>
         </p:txBody>
@@ -6217,9 +6222,10 @@
           <a:p>
             <a:pPr algn="ctr"/>
             <a:r>
-              <a:rPr lang="en-US" dirty="0"/>
-              <a:t>Sub-App</a:t>
-            </a:r>
+              <a:rPr lang="en-US"/>
+              <a:t>Child-App</a:t>
+            </a:r>
+            <a:endParaRPr lang="en-US" dirty="0"/>
           </a:p>
         </p:txBody>
       </p:sp>

</xml_diff>